<commit_message>
fix(backend/plans/reports): gestion de la police pour les graphes & prise en compte des derniers retours
</commit_message>
<xml_diff>
--- a/apps/backend/src/plans/reports/generate-plan-report-pptx/docs/template_bilan.pptx
+++ b/apps/backend/src/plans/reports/generate-plan-report-pptx/docs/template_bilan.pptx
@@ -24509,7 +24509,7 @@
                 <a:buNone/>
               </a:pPr>
               <a:r>
-                <a:rPr lang="fr" sz="970" b="1">
+                <a:rPr lang="fr" sz="970" b="1" dirty="0">
                   <a:solidFill>
                     <a:schemeClr val="dk1"/>
                   </a:solidFill>
@@ -24521,7 +24521,7 @@
                 <a:t>Budget prévisionnel :  </a:t>
               </a:r>
               <a:r>
-                <a:rPr lang="fr" sz="1078">
+                <a:rPr lang="fr" sz="1078" dirty="0">
                   <a:solidFill>
                     <a:schemeClr val="accent3"/>
                   </a:solidFill>
@@ -24533,7 +24533,7 @@
                 <a:t>{{FICHE_BUDGET_TOTAL}} HT </a:t>
               </a:r>
               <a:br>
-                <a:rPr lang="fr" sz="903">
+                <a:rPr lang="fr" sz="903" dirty="0">
                   <a:solidFill>
                     <a:schemeClr val="accent3"/>
                   </a:solidFill>
@@ -24544,7 +24544,7 @@
                 </a:rPr>
               </a:br>
               <a:r>
-                <a:rPr lang="fr" sz="850">
+                <a:rPr lang="fr" sz="850" dirty="0">
                   <a:solidFill>
                     <a:schemeClr val="dk1"/>
                   </a:solidFill>
@@ -24555,7 +24555,7 @@
                 </a:rPr>
                 <a:t>({{FICHE_BUDGET_INVESTISSEMENT}} investissement + {{FICHE_BUDGET_FONCTIONNEMENT}} fonctionnement)</a:t>
               </a:r>
-              <a:endParaRPr sz="903">
+              <a:endParaRPr sz="903" dirty="0">
                 <a:solidFill>
                   <a:schemeClr val="accent3"/>
                 </a:solidFill>
@@ -25041,76 +25041,6 @@
             </a:p>
           </p:txBody>
         </p:sp>
-        <p:sp>
-          <p:nvSpPr>
-            <p:cNvPr id="346" name="txt_fiche_fill_missing_info_link">
-              <a:hlinkClick r:id="rId6"/>
-            </p:cNvPr>
-            <p:cNvSpPr/>
-            <p:nvPr/>
-          </p:nvSpPr>
-          <p:spPr>
-            <a:xfrm>
-              <a:off x="7520850" y="4818100"/>
-              <a:ext cx="1490100" cy="250500"/>
-            </a:xfrm>
-            <a:prstGeom prst="roundRect">
-              <a:avLst>
-                <a:gd name="adj" fmla="val 16667"/>
-              </a:avLst>
-            </a:prstGeom>
-            <a:solidFill>
-              <a:schemeClr val="lt1"/>
-            </a:solidFill>
-            <a:ln w="9525" cap="flat" cmpd="sng">
-              <a:solidFill>
-                <a:srgbClr val="EEEEEE"/>
-              </a:solidFill>
-              <a:prstDash val="solid"/>
-              <a:round/>
-              <a:headEnd type="none" w="sm" len="sm"/>
-              <a:tailEnd type="none" w="sm" len="sm"/>
-            </a:ln>
-          </p:spPr>
-          <p:txBody>
-            <a:bodyPr spcFirstLastPara="1" wrap="square" lIns="91425" tIns="91425" rIns="91425" bIns="91425" anchor="ctr" anchorCtr="0">
-              <a:noAutofit/>
-            </a:bodyPr>
-            <a:lstStyle/>
-            <a:p>
-              <a:pPr marL="0" lvl="0" indent="0" algn="ctr" rtl="0">
-                <a:spcBef>
-                  <a:spcPts val="0"/>
-                </a:spcBef>
-                <a:spcAft>
-                  <a:spcPts val="0"/>
-                </a:spcAft>
-                <a:buNone/>
-              </a:pPr>
-              <a:r>
-                <a:rPr lang="fr" sz="800" dirty="0">
-                  <a:solidFill>
-                    <a:srgbClr val="434343"/>
-                  </a:solidFill>
-                  <a:latin typeface="Poppins Medium"/>
-                  <a:ea typeface="Poppins Medium"/>
-                  <a:cs typeface="Poppins Medium"/>
-                  <a:sym typeface="Poppins Medium"/>
-                </a:rPr>
-                <a:t>Cliquez pour les ajouter</a:t>
-              </a:r>
-              <a:endParaRPr sz="800" dirty="0">
-                <a:solidFill>
-                  <a:srgbClr val="434343"/>
-                </a:solidFill>
-                <a:latin typeface="Poppins Medium"/>
-                <a:ea typeface="Poppins Medium"/>
-                <a:cs typeface="Poppins Medium"/>
-                <a:sym typeface="Poppins Medium"/>
-              </a:endParaRPr>
-            </a:p>
-          </p:txBody>
-        </p:sp>
         <p:pic>
           <p:nvPicPr>
             <p:cNvPr id="347" name="Google Shape;347;p43" title="Icône.png"/>
@@ -25118,7 +25048,7 @@
             <p:nvPr/>
           </p:nvPicPr>
           <p:blipFill>
-            <a:blip r:embed="rId7">
+            <a:blip r:embed="rId6">
               <a:alphaModFix/>
             </a:blip>
             <a:stretch>
@@ -25905,7 +25835,7 @@
           <p:nvPr/>
         </p:nvPicPr>
         <p:blipFill rotWithShape="1">
-          <a:blip r:embed="rId8">
+          <a:blip r:embed="rId7">
             <a:alphaModFix/>
           </a:blip>
           <a:srcRect/>
@@ -26450,7 +26380,7 @@
         <p:spPr>
           <a:xfrm>
             <a:off x="288500" y="1059775"/>
-            <a:ext cx="7773300" cy="1323600"/>
+            <a:ext cx="8703100" cy="1692741"/>
           </a:xfrm>
           <a:prstGeom prst="rect">
             <a:avLst/>
@@ -26476,7 +26406,7 @@
               <a:buNone/>
             </a:pPr>
             <a:r>
-              <a:rPr lang="fr" b="1">
+              <a:rPr lang="fr" b="1" dirty="0">
                 <a:solidFill>
                   <a:schemeClr val="lt1"/>
                 </a:solidFill>
@@ -26487,7 +26417,7 @@
               </a:rPr>
               <a:t>Données territoriales : </a:t>
             </a:r>
-            <a:endParaRPr b="1">
+            <a:endParaRPr b="1" dirty="0">
               <a:solidFill>
                 <a:schemeClr val="lt1"/>
               </a:solidFill>
@@ -26498,13 +26428,7 @@
             </a:endParaRPr>
           </a:p>
           <a:p>
-            <a:pPr marL="457200" lvl="0" indent="-304800" algn="l" rtl="0">
-              <a:spcBef>
-                <a:spcPts val="0"/>
-              </a:spcBef>
-              <a:spcAft>
-                <a:spcPts val="0"/>
-              </a:spcAft>
+            <a:pPr marL="457200" lvl="0" indent="-304800">
               <a:buClr>
                 <a:schemeClr val="lt1"/>
               </a:buClr>
@@ -26513,7 +26437,7 @@
               <a:buChar char="-"/>
             </a:pPr>
             <a:r>
-              <a:rPr lang="fr" sz="1200" b="1">
+              <a:rPr lang="fr" sz="1200" b="1" dirty="0">
                 <a:solidFill>
                   <a:schemeClr val="lt1"/>
                 </a:solidFill>
@@ -26525,7 +26449,125 @@
               <a:t>Consommation d’énergie : </a:t>
             </a:r>
             <a:r>
-              <a:rPr lang="fr" sz="1200">
+              <a:rPr lang="fr-FR" sz="1200" dirty="0">
+                <a:solidFill>
+                  <a:schemeClr val="lt1"/>
+                </a:solidFill>
+                <a:latin typeface="Poppins"/>
+                <a:cs typeface="Poppins"/>
+              </a:rPr>
+              <a:t>https://</a:t>
+            </a:r>
+            <a:r>
+              <a:rPr lang="fr-FR" sz="1200" dirty="0" err="1">
+                <a:solidFill>
+                  <a:schemeClr val="lt1"/>
+                </a:solidFill>
+                <a:latin typeface="Poppins"/>
+                <a:cs typeface="Poppins"/>
+              </a:rPr>
+              <a:t>www.data.gouv.fr</a:t>
+            </a:r>
+            <a:r>
+              <a:rPr lang="fr-FR" sz="1200" dirty="0">
+                <a:solidFill>
+                  <a:schemeClr val="lt1"/>
+                </a:solidFill>
+                <a:latin typeface="Poppins"/>
+                <a:cs typeface="Poppins"/>
+              </a:rPr>
+              <a:t>/</a:t>
+            </a:r>
+            <a:r>
+              <a:rPr lang="fr-FR" sz="1200" dirty="0" err="1">
+                <a:solidFill>
+                  <a:schemeClr val="lt1"/>
+                </a:solidFill>
+                <a:latin typeface="Poppins"/>
+                <a:cs typeface="Poppins"/>
+              </a:rPr>
+              <a:t>datasets</a:t>
+            </a:r>
+            <a:r>
+              <a:rPr lang="fr-FR" sz="1200" dirty="0">
+                <a:solidFill>
+                  <a:schemeClr val="lt1"/>
+                </a:solidFill>
+                <a:latin typeface="Poppins"/>
+                <a:cs typeface="Poppins"/>
+              </a:rPr>
+              <a:t>/bouquet-</a:t>
+            </a:r>
+            <a:r>
+              <a:rPr lang="fr-FR" sz="1200" dirty="0" err="1">
+                <a:solidFill>
+                  <a:schemeClr val="lt1"/>
+                </a:solidFill>
+                <a:latin typeface="Poppins"/>
+                <a:cs typeface="Poppins"/>
+              </a:rPr>
+              <a:t>dindicateurs</a:t>
+            </a:r>
+            <a:r>
+              <a:rPr lang="fr-FR" sz="1200" dirty="0">
+                <a:solidFill>
+                  <a:schemeClr val="lt1"/>
+                </a:solidFill>
+                <a:latin typeface="Poppins"/>
+                <a:cs typeface="Poppins"/>
+              </a:rPr>
+              <a:t>-communs-</a:t>
+            </a:r>
+            <a:r>
+              <a:rPr lang="fr-FR" sz="1200" dirty="0" err="1">
+                <a:solidFill>
+                  <a:schemeClr val="lt1"/>
+                </a:solidFill>
+                <a:latin typeface="Poppins"/>
+                <a:cs typeface="Poppins"/>
+              </a:rPr>
+              <a:t>energie</a:t>
+            </a:r>
+            <a:r>
+              <a:rPr lang="fr-FR" sz="1200" dirty="0">
+                <a:solidFill>
+                  <a:schemeClr val="lt1"/>
+                </a:solidFill>
+                <a:latin typeface="Poppins"/>
+                <a:cs typeface="Poppins"/>
+              </a:rPr>
+              <a:t>-climat-des-</a:t>
+            </a:r>
+            <a:r>
+              <a:rPr lang="fr-FR" sz="1200" dirty="0" err="1">
+                <a:solidFill>
+                  <a:schemeClr val="lt1"/>
+                </a:solidFill>
+                <a:latin typeface="Poppins"/>
+                <a:cs typeface="Poppins"/>
+              </a:rPr>
+              <a:t>orec</a:t>
+            </a:r>
+            <a:endParaRPr sz="1200" dirty="0">
+              <a:solidFill>
+                <a:schemeClr val="lt1"/>
+              </a:solidFill>
+              <a:latin typeface="Poppins"/>
+              <a:cs typeface="Poppins"/>
+              <a:sym typeface="Poppins"/>
+            </a:endParaRPr>
+          </a:p>
+          <a:p>
+            <a:pPr marL="457200" lvl="0" indent="-304800">
+              <a:buClr>
+                <a:schemeClr val="lt1"/>
+              </a:buClr>
+              <a:buSzPts val="1200"/>
+              <a:buFont typeface="Poppins"/>
+              <a:buChar char="-"/>
+            </a:pPr>
+            <a:r>
+              <a:rPr lang="fr" sz="1200" b="1" dirty="0">
                 <a:solidFill>
                   <a:schemeClr val="lt1"/>
                 </a:solidFill>
@@ -26534,9 +26576,109 @@
                 <a:cs typeface="Poppins"/>
                 <a:sym typeface="Poppins"/>
               </a:rPr>
-              <a:t>https://ecologie.data.gouv.fr/</a:t>
+              <a:t>GES : </a:t>
             </a:r>
-            <a:endParaRPr sz="1200">
+            <a:r>
+              <a:rPr lang="fr-FR" sz="1200" dirty="0">
+                <a:solidFill>
+                  <a:schemeClr val="lt1"/>
+                </a:solidFill>
+                <a:latin typeface="Poppins"/>
+                <a:cs typeface="Poppins"/>
+              </a:rPr>
+              <a:t>https://</a:t>
+            </a:r>
+            <a:r>
+              <a:rPr lang="fr-FR" sz="1200" dirty="0" err="1">
+                <a:solidFill>
+                  <a:schemeClr val="lt1"/>
+                </a:solidFill>
+                <a:latin typeface="Poppins"/>
+                <a:cs typeface="Poppins"/>
+              </a:rPr>
+              <a:t>www.data.gouv.fr</a:t>
+            </a:r>
+            <a:r>
+              <a:rPr lang="fr-FR" sz="1200" dirty="0">
+                <a:solidFill>
+                  <a:schemeClr val="lt1"/>
+                </a:solidFill>
+                <a:latin typeface="Poppins"/>
+                <a:cs typeface="Poppins"/>
+              </a:rPr>
+              <a:t>/</a:t>
+            </a:r>
+            <a:r>
+              <a:rPr lang="fr-FR" sz="1200" dirty="0" err="1">
+                <a:solidFill>
+                  <a:schemeClr val="lt1"/>
+                </a:solidFill>
+                <a:latin typeface="Poppins"/>
+                <a:cs typeface="Poppins"/>
+              </a:rPr>
+              <a:t>datasets</a:t>
+            </a:r>
+            <a:r>
+              <a:rPr lang="fr-FR" sz="1200" dirty="0">
+                <a:solidFill>
+                  <a:schemeClr val="lt1"/>
+                </a:solidFill>
+                <a:latin typeface="Poppins"/>
+                <a:cs typeface="Poppins"/>
+              </a:rPr>
+              <a:t>/bouquet-</a:t>
+            </a:r>
+            <a:r>
+              <a:rPr lang="fr-FR" sz="1200" dirty="0" err="1">
+                <a:solidFill>
+                  <a:schemeClr val="lt1"/>
+                </a:solidFill>
+                <a:latin typeface="Poppins"/>
+                <a:cs typeface="Poppins"/>
+              </a:rPr>
+              <a:t>dindicateurs</a:t>
+            </a:r>
+            <a:r>
+              <a:rPr lang="fr-FR" sz="1200" dirty="0">
+                <a:solidFill>
+                  <a:schemeClr val="lt1"/>
+                </a:solidFill>
+                <a:latin typeface="Poppins"/>
+                <a:cs typeface="Poppins"/>
+              </a:rPr>
+              <a:t>-communs-</a:t>
+            </a:r>
+            <a:r>
+              <a:rPr lang="fr-FR" sz="1200" dirty="0" err="1">
+                <a:solidFill>
+                  <a:schemeClr val="lt1"/>
+                </a:solidFill>
+                <a:latin typeface="Poppins"/>
+                <a:cs typeface="Poppins"/>
+              </a:rPr>
+              <a:t>energie</a:t>
+            </a:r>
+            <a:r>
+              <a:rPr lang="fr-FR" sz="1200" dirty="0">
+                <a:solidFill>
+                  <a:schemeClr val="lt1"/>
+                </a:solidFill>
+                <a:latin typeface="Poppins"/>
+                <a:cs typeface="Poppins"/>
+              </a:rPr>
+              <a:t>-climat-des-</a:t>
+            </a:r>
+            <a:r>
+              <a:rPr lang="fr-FR" sz="1200" dirty="0" err="1">
+                <a:solidFill>
+                  <a:schemeClr val="lt1"/>
+                </a:solidFill>
+                <a:latin typeface="Poppins"/>
+                <a:cs typeface="Poppins"/>
+              </a:rPr>
+              <a:t>orec</a:t>
+            </a:r>
+            <a:endParaRPr sz="1200" dirty="0">
               <a:solidFill>
                 <a:schemeClr val="lt1"/>
               </a:solidFill>
@@ -26547,13 +26689,7 @@
             </a:endParaRPr>
           </a:p>
           <a:p>
-            <a:pPr marL="457200" lvl="0" indent="-304800" algn="l" rtl="0">
-              <a:spcBef>
-                <a:spcPts val="0"/>
-              </a:spcBef>
-              <a:spcAft>
-                <a:spcPts val="0"/>
-              </a:spcAft>
+            <a:pPr marL="457200" lvl="0" indent="-304800">
               <a:buClr>
                 <a:schemeClr val="lt1"/>
               </a:buClr>
@@ -26562,56 +26698,7 @@
               <a:buChar char="-"/>
             </a:pPr>
             <a:r>
-              <a:rPr lang="fr" sz="1200" b="1">
-                <a:solidFill>
-                  <a:schemeClr val="lt1"/>
-                </a:solidFill>
-                <a:latin typeface="Poppins"/>
-                <a:ea typeface="Poppins"/>
-                <a:cs typeface="Poppins"/>
-                <a:sym typeface="Poppins"/>
-              </a:rPr>
-              <a:t>GES : </a:t>
-            </a:r>
-            <a:r>
-              <a:rPr lang="fr" sz="1200">
-                <a:solidFill>
-                  <a:schemeClr val="lt1"/>
-                </a:solidFill>
-                <a:latin typeface="Poppins"/>
-                <a:ea typeface="Poppins"/>
-                <a:cs typeface="Poppins"/>
-                <a:sym typeface="Poppins"/>
-              </a:rPr>
-              <a:t>https://ecologie.data.gouv.fr/</a:t>
-            </a:r>
-            <a:endParaRPr sz="1200">
-              <a:solidFill>
-                <a:schemeClr val="lt1"/>
-              </a:solidFill>
-              <a:latin typeface="Poppins"/>
-              <a:ea typeface="Poppins"/>
-              <a:cs typeface="Poppins"/>
-              <a:sym typeface="Poppins"/>
-            </a:endParaRPr>
-          </a:p>
-          <a:p>
-            <a:pPr marL="457200" lvl="0" indent="-304800" algn="l" rtl="0">
-              <a:spcBef>
-                <a:spcPts val="0"/>
-              </a:spcBef>
-              <a:spcAft>
-                <a:spcPts val="0"/>
-              </a:spcAft>
-              <a:buClr>
-                <a:schemeClr val="lt1"/>
-              </a:buClr>
-              <a:buSzPts val="1200"/>
-              <a:buFont typeface="Poppins"/>
-              <a:buChar char="-"/>
-            </a:pPr>
-            <a:r>
-              <a:rPr lang="fr" sz="1200" b="1">
+              <a:rPr lang="fr" sz="1200" b="1" dirty="0">
                 <a:solidFill>
                   <a:schemeClr val="lt1"/>
                 </a:solidFill>
@@ -26623,25 +26710,106 @@
               <a:t>Production ENR : </a:t>
             </a:r>
             <a:r>
-              <a:rPr lang="fr" sz="1200" u="sng">
+              <a:rPr lang="fr-FR" sz="1200" dirty="0">
                 <a:solidFill>
                   <a:schemeClr val="lt1"/>
                 </a:solidFill>
                 <a:latin typeface="Poppins"/>
-                <a:ea typeface="Poppins"/>
                 <a:cs typeface="Poppins"/>
-                <a:sym typeface="Poppins"/>
-                <a:hlinkClick r:id="rId4">
-                  <a:extLst>
-                    <a:ext uri="{A12FA001-AC4F-418D-AE19-62706E023703}">
-                      <ahyp:hlinkClr xmlns:ahyp="http://schemas.microsoft.com/office/drawing/2018/hyperlinkcolor" val="tx"/>
-                    </a:ext>
-                  </a:extLst>
-                </a:hlinkClick>
               </a:rPr>
-              <a:t>https://ecologie.data.gouv.fr/</a:t>
+              <a:t>https://</a:t>
             </a:r>
-            <a:endParaRPr>
+            <a:r>
+              <a:rPr lang="fr-FR" sz="1200" dirty="0" err="1">
+                <a:solidFill>
+                  <a:schemeClr val="lt1"/>
+                </a:solidFill>
+                <a:latin typeface="Poppins"/>
+                <a:cs typeface="Poppins"/>
+              </a:rPr>
+              <a:t>www.data.gouv.fr</a:t>
+            </a:r>
+            <a:r>
+              <a:rPr lang="fr-FR" sz="1200" dirty="0">
+                <a:solidFill>
+                  <a:schemeClr val="lt1"/>
+                </a:solidFill>
+                <a:latin typeface="Poppins"/>
+                <a:cs typeface="Poppins"/>
+              </a:rPr>
+              <a:t>/</a:t>
+            </a:r>
+            <a:r>
+              <a:rPr lang="fr-FR" sz="1200" dirty="0" err="1">
+                <a:solidFill>
+                  <a:schemeClr val="lt1"/>
+                </a:solidFill>
+                <a:latin typeface="Poppins"/>
+                <a:cs typeface="Poppins"/>
+              </a:rPr>
+              <a:t>datasets</a:t>
+            </a:r>
+            <a:r>
+              <a:rPr lang="fr-FR" sz="1200" dirty="0">
+                <a:solidFill>
+                  <a:schemeClr val="lt1"/>
+                </a:solidFill>
+                <a:latin typeface="Poppins"/>
+                <a:cs typeface="Poppins"/>
+              </a:rPr>
+              <a:t>/bouquet-</a:t>
+            </a:r>
+            <a:r>
+              <a:rPr lang="fr-FR" sz="1200" dirty="0" err="1">
+                <a:solidFill>
+                  <a:schemeClr val="lt1"/>
+                </a:solidFill>
+                <a:latin typeface="Poppins"/>
+                <a:cs typeface="Poppins"/>
+              </a:rPr>
+              <a:t>dindicateurs</a:t>
+            </a:r>
+            <a:r>
+              <a:rPr lang="fr-FR" sz="1200" dirty="0">
+                <a:solidFill>
+                  <a:schemeClr val="lt1"/>
+                </a:solidFill>
+                <a:latin typeface="Poppins"/>
+                <a:cs typeface="Poppins"/>
+              </a:rPr>
+              <a:t>-communs-</a:t>
+            </a:r>
+            <a:r>
+              <a:rPr lang="fr-FR" sz="1200" dirty="0" err="1">
+                <a:solidFill>
+                  <a:schemeClr val="lt1"/>
+                </a:solidFill>
+                <a:latin typeface="Poppins"/>
+                <a:cs typeface="Poppins"/>
+              </a:rPr>
+              <a:t>energie</a:t>
+            </a:r>
+            <a:r>
+              <a:rPr lang="fr-FR" sz="1200" dirty="0">
+                <a:solidFill>
+                  <a:schemeClr val="lt1"/>
+                </a:solidFill>
+                <a:latin typeface="Poppins"/>
+                <a:cs typeface="Poppins"/>
+              </a:rPr>
+              <a:t>-climat-des-</a:t>
+            </a:r>
+            <a:r>
+              <a:rPr lang="fr-FR" sz="1200" dirty="0" err="1">
+                <a:solidFill>
+                  <a:schemeClr val="lt1"/>
+                </a:solidFill>
+                <a:latin typeface="Poppins"/>
+                <a:cs typeface="Poppins"/>
+              </a:rPr>
+              <a:t>orec</a:t>
+            </a:r>
+            <a:endParaRPr dirty="0">
               <a:solidFill>
                 <a:schemeClr val="lt1"/>
               </a:solidFill>
@@ -26661,7 +26829,7 @@
               </a:spcAft>
               <a:buNone/>
             </a:pPr>
-            <a:endParaRPr sz="1200">
+            <a:endParaRPr sz="1200" dirty="0">
               <a:solidFill>
                 <a:schemeClr val="lt1"/>
               </a:solidFill>
@@ -26682,7 +26850,7 @@
               <a:buNone/>
             </a:pPr>
             <a:r>
-              <a:rPr lang="fr" sz="1200">
+              <a:rPr lang="fr" sz="1200" dirty="0">
                 <a:solidFill>
                   <a:schemeClr val="lt1"/>
                 </a:solidFill>
@@ -26694,7 +26862,7 @@
               <a:t>Rapport généré par </a:t>
             </a:r>
             <a:r>
-              <a:rPr lang="fr" sz="1200" b="1">
+              <a:rPr lang="fr" sz="1200" b="1" dirty="0">
                 <a:solidFill>
                   <a:schemeClr val="lt1"/>
                 </a:solidFill>
@@ -26705,7 +26873,7 @@
               </a:rPr>
               <a:t>Territoires en Transitions</a:t>
             </a:r>
-            <a:endParaRPr sz="1200" b="1">
+            <a:endParaRPr sz="1200" b="1" dirty="0">
               <a:solidFill>
                 <a:schemeClr val="lt1"/>
               </a:solidFill>

</xml_diff>